<commit_message>
Add more sections on classes
</commit_message>
<xml_diff>
--- a/cpp-review/memory/images-ppt.pptx
+++ b/cpp-review/memory/images-ppt.pptx
@@ -24,6 +24,7 @@
     <p:sldId id="285" r:id="rId18"/>
     <p:sldId id="286" r:id="rId19"/>
     <p:sldId id="287" r:id="rId20"/>
+    <p:sldId id="288" r:id="rId21"/>
   </p:sldIdLst>
   <p:sldSz cx="12192000" cy="6858000"/>
   <p:notesSz cx="6858000" cy="9144000"/>
@@ -261,7 +262,7 @@
           <a:p>
             <a:fld id="{B78156CE-6130-472E-8AFC-DEAB1BC7C693}" type="datetimeFigureOut">
               <a:rPr lang="en-US" smtClean="0"/>
-              <a:t>11/24/2024</a:t>
+              <a:t>11/25/2024</a:t>
             </a:fld>
             <a:endParaRPr lang="en-US"/>
           </a:p>
@@ -431,7 +432,7 @@
           <a:p>
             <a:fld id="{B78156CE-6130-472E-8AFC-DEAB1BC7C693}" type="datetimeFigureOut">
               <a:rPr lang="en-US" smtClean="0"/>
-              <a:t>11/24/2024</a:t>
+              <a:t>11/25/2024</a:t>
             </a:fld>
             <a:endParaRPr lang="en-US"/>
           </a:p>
@@ -611,7 +612,7 @@
           <a:p>
             <a:fld id="{B78156CE-6130-472E-8AFC-DEAB1BC7C693}" type="datetimeFigureOut">
               <a:rPr lang="en-US" smtClean="0"/>
-              <a:t>11/24/2024</a:t>
+              <a:t>11/25/2024</a:t>
             </a:fld>
             <a:endParaRPr lang="en-US"/>
           </a:p>
@@ -781,7 +782,7 @@
           <a:p>
             <a:fld id="{B78156CE-6130-472E-8AFC-DEAB1BC7C693}" type="datetimeFigureOut">
               <a:rPr lang="en-US" smtClean="0"/>
-              <a:t>11/24/2024</a:t>
+              <a:t>11/25/2024</a:t>
             </a:fld>
             <a:endParaRPr lang="en-US"/>
           </a:p>
@@ -1027,7 +1028,7 @@
           <a:p>
             <a:fld id="{B78156CE-6130-472E-8AFC-DEAB1BC7C693}" type="datetimeFigureOut">
               <a:rPr lang="en-US" smtClean="0"/>
-              <a:t>11/24/2024</a:t>
+              <a:t>11/25/2024</a:t>
             </a:fld>
             <a:endParaRPr lang="en-US"/>
           </a:p>
@@ -1259,7 +1260,7 @@
           <a:p>
             <a:fld id="{B78156CE-6130-472E-8AFC-DEAB1BC7C693}" type="datetimeFigureOut">
               <a:rPr lang="en-US" smtClean="0"/>
-              <a:t>11/24/2024</a:t>
+              <a:t>11/25/2024</a:t>
             </a:fld>
             <a:endParaRPr lang="en-US"/>
           </a:p>
@@ -1626,7 +1627,7 @@
           <a:p>
             <a:fld id="{B78156CE-6130-472E-8AFC-DEAB1BC7C693}" type="datetimeFigureOut">
               <a:rPr lang="en-US" smtClean="0"/>
-              <a:t>11/24/2024</a:t>
+              <a:t>11/25/2024</a:t>
             </a:fld>
             <a:endParaRPr lang="en-US"/>
           </a:p>
@@ -1744,7 +1745,7 @@
           <a:p>
             <a:fld id="{B78156CE-6130-472E-8AFC-DEAB1BC7C693}" type="datetimeFigureOut">
               <a:rPr lang="en-US" smtClean="0"/>
-              <a:t>11/24/2024</a:t>
+              <a:t>11/25/2024</a:t>
             </a:fld>
             <a:endParaRPr lang="en-US"/>
           </a:p>
@@ -1839,7 +1840,7 @@
           <a:p>
             <a:fld id="{B78156CE-6130-472E-8AFC-DEAB1BC7C693}" type="datetimeFigureOut">
               <a:rPr lang="en-US" smtClean="0"/>
-              <a:t>11/24/2024</a:t>
+              <a:t>11/25/2024</a:t>
             </a:fld>
             <a:endParaRPr lang="en-US"/>
           </a:p>
@@ -2116,7 +2117,7 @@
           <a:p>
             <a:fld id="{B78156CE-6130-472E-8AFC-DEAB1BC7C693}" type="datetimeFigureOut">
               <a:rPr lang="en-US" smtClean="0"/>
-              <a:t>11/24/2024</a:t>
+              <a:t>11/25/2024</a:t>
             </a:fld>
             <a:endParaRPr lang="en-US"/>
           </a:p>
@@ -2373,7 +2374,7 @@
           <a:p>
             <a:fld id="{B78156CE-6130-472E-8AFC-DEAB1BC7C693}" type="datetimeFigureOut">
               <a:rPr lang="en-US" smtClean="0"/>
-              <a:t>11/24/2024</a:t>
+              <a:t>11/25/2024</a:t>
             </a:fld>
             <a:endParaRPr lang="en-US"/>
           </a:p>
@@ -2586,7 +2587,7 @@
           <a:p>
             <a:fld id="{B78156CE-6130-472E-8AFC-DEAB1BC7C693}" type="datetimeFigureOut">
               <a:rPr lang="en-US" smtClean="0"/>
-              <a:t>11/24/2024</a:t>
+              <a:t>11/25/2024</a:t>
             </a:fld>
             <a:endParaRPr lang="en-US"/>
           </a:p>
@@ -13758,6 +13759,464 @@
 </p:sld>
 </file>
 
+<file path=ppt/slides/slide20.xml><?xml version="1.0" encoding="utf-8"?>
+<p:sld xmlns:a="http://schemas.openxmlformats.org/drawingml/2006/main" xmlns:r="http://schemas.openxmlformats.org/officeDocument/2006/relationships" xmlns:p="http://schemas.openxmlformats.org/presentationml/2006/main">
+  <p:cSld>
+    <p:spTree>
+      <p:nvGrpSpPr>
+        <p:cNvPr id="1" name=""/>
+        <p:cNvGrpSpPr/>
+        <p:nvPr/>
+      </p:nvGrpSpPr>
+      <p:grpSpPr>
+        <a:xfrm>
+          <a:off x="0" y="0"/>
+          <a:ext cx="0" cy="0"/>
+          <a:chOff x="0" y="0"/>
+          <a:chExt cx="0" cy="0"/>
+        </a:xfrm>
+      </p:grpSpPr>
+      <p:sp>
+        <p:nvSpPr>
+          <p:cNvPr id="2" name="Rectangle 1">
+            <a:extLst>
+              <a:ext uri="{FF2B5EF4-FFF2-40B4-BE49-F238E27FC236}">
+                <a16:creationId xmlns:a16="http://schemas.microsoft.com/office/drawing/2014/main" id="{88A77B5B-7743-9E33-DEB2-B2488D8FB7CB}"/>
+              </a:ext>
+            </a:extLst>
+          </p:cNvPr>
+          <p:cNvSpPr/>
+          <p:nvPr/>
+        </p:nvSpPr>
+        <p:spPr>
+          <a:xfrm>
+            <a:off x="4953000" y="1143000"/>
+            <a:ext cx="2286000" cy="914400"/>
+          </a:xfrm>
+          <a:prstGeom prst="rect">
+            <a:avLst/>
+          </a:prstGeom>
+          <a:noFill/>
+          <a:ln w="28575" cap="flat" cmpd="sng" algn="ctr">
+            <a:solidFill>
+              <a:schemeClr val="accent1"/>
+            </a:solidFill>
+            <a:prstDash val="solid"/>
+            <a:round/>
+            <a:headEnd type="none" w="med" len="med"/>
+            <a:tailEnd type="none" w="med" len="med"/>
+          </a:ln>
+        </p:spPr>
+        <p:style>
+          <a:lnRef idx="0">
+            <a:scrgbClr r="0" g="0" b="0"/>
+          </a:lnRef>
+          <a:fillRef idx="0">
+            <a:scrgbClr r="0" g="0" b="0"/>
+          </a:fillRef>
+          <a:effectRef idx="0">
+            <a:scrgbClr r="0" g="0" b="0"/>
+          </a:effectRef>
+          <a:fontRef idx="minor">
+            <a:schemeClr val="accent1"/>
+          </a:fontRef>
+        </p:style>
+        <p:txBody>
+          <a:bodyPr rtlCol="0" anchor="ctr"/>
+          <a:lstStyle/>
+          <a:p>
+            <a:pPr algn="ctr"/>
+            <a:r>
+              <a:rPr lang="en-US" dirty="0">
+                <a:solidFill>
+                  <a:schemeClr val="tx1"/>
+                </a:solidFill>
+              </a:rPr>
+              <a:t>class A</a:t>
+            </a:r>
+          </a:p>
+        </p:txBody>
+      </p:sp>
+      <p:sp>
+        <p:nvSpPr>
+          <p:cNvPr id="3" name="Rectangle 2">
+            <a:extLst>
+              <a:ext uri="{FF2B5EF4-FFF2-40B4-BE49-F238E27FC236}">
+                <a16:creationId xmlns:a16="http://schemas.microsoft.com/office/drawing/2014/main" id="{D628D2EE-74D8-E66C-A281-B2DBC0D12AE7}"/>
+              </a:ext>
+            </a:extLst>
+          </p:cNvPr>
+          <p:cNvSpPr/>
+          <p:nvPr/>
+        </p:nvSpPr>
+        <p:spPr>
+          <a:xfrm>
+            <a:off x="2667000" y="2971800"/>
+            <a:ext cx="2286000" cy="914400"/>
+          </a:xfrm>
+          <a:prstGeom prst="rect">
+            <a:avLst/>
+          </a:prstGeom>
+          <a:noFill/>
+          <a:ln w="28575" cap="flat" cmpd="sng" algn="ctr">
+            <a:solidFill>
+              <a:schemeClr val="accent1"/>
+            </a:solidFill>
+            <a:prstDash val="solid"/>
+            <a:round/>
+            <a:headEnd type="none" w="med" len="med"/>
+            <a:tailEnd type="none" w="med" len="med"/>
+          </a:ln>
+        </p:spPr>
+        <p:style>
+          <a:lnRef idx="0">
+            <a:scrgbClr r="0" g="0" b="0"/>
+          </a:lnRef>
+          <a:fillRef idx="0">
+            <a:scrgbClr r="0" g="0" b="0"/>
+          </a:fillRef>
+          <a:effectRef idx="0">
+            <a:scrgbClr r="0" g="0" b="0"/>
+          </a:effectRef>
+          <a:fontRef idx="minor">
+            <a:schemeClr val="accent1"/>
+          </a:fontRef>
+        </p:style>
+        <p:txBody>
+          <a:bodyPr rtlCol="0" anchor="ctr"/>
+          <a:lstStyle/>
+          <a:p>
+            <a:pPr algn="ctr"/>
+            <a:r>
+              <a:rPr lang="en-US" dirty="0">
+                <a:solidFill>
+                  <a:schemeClr val="tx1"/>
+                </a:solidFill>
+              </a:rPr>
+              <a:t>class B : public A</a:t>
+            </a:r>
+          </a:p>
+        </p:txBody>
+      </p:sp>
+      <p:sp>
+        <p:nvSpPr>
+          <p:cNvPr id="4" name="Rectangle 3">
+            <a:extLst>
+              <a:ext uri="{FF2B5EF4-FFF2-40B4-BE49-F238E27FC236}">
+                <a16:creationId xmlns:a16="http://schemas.microsoft.com/office/drawing/2014/main" id="{02BE5FDE-D14B-1898-ADCC-027F984F6DAC}"/>
+              </a:ext>
+            </a:extLst>
+          </p:cNvPr>
+          <p:cNvSpPr/>
+          <p:nvPr/>
+        </p:nvSpPr>
+        <p:spPr>
+          <a:xfrm>
+            <a:off x="7239000" y="2971800"/>
+            <a:ext cx="2286000" cy="914400"/>
+          </a:xfrm>
+          <a:prstGeom prst="rect">
+            <a:avLst/>
+          </a:prstGeom>
+          <a:noFill/>
+          <a:ln w="28575" cap="flat" cmpd="sng" algn="ctr">
+            <a:solidFill>
+              <a:schemeClr val="accent1"/>
+            </a:solidFill>
+            <a:prstDash val="solid"/>
+            <a:round/>
+            <a:headEnd type="none" w="med" len="med"/>
+            <a:tailEnd type="none" w="med" len="med"/>
+          </a:ln>
+        </p:spPr>
+        <p:style>
+          <a:lnRef idx="0">
+            <a:scrgbClr r="0" g="0" b="0"/>
+          </a:lnRef>
+          <a:fillRef idx="0">
+            <a:scrgbClr r="0" g="0" b="0"/>
+          </a:fillRef>
+          <a:effectRef idx="0">
+            <a:scrgbClr r="0" g="0" b="0"/>
+          </a:effectRef>
+          <a:fontRef idx="minor">
+            <a:schemeClr val="accent1"/>
+          </a:fontRef>
+        </p:style>
+        <p:txBody>
+          <a:bodyPr rtlCol="0" anchor="ctr"/>
+          <a:lstStyle/>
+          <a:p>
+            <a:pPr algn="ctr"/>
+            <a:r>
+              <a:rPr lang="en-US" dirty="0">
+                <a:solidFill>
+                  <a:schemeClr val="tx1"/>
+                </a:solidFill>
+              </a:rPr>
+              <a:t>class C : public A</a:t>
+            </a:r>
+          </a:p>
+        </p:txBody>
+      </p:sp>
+      <p:sp>
+        <p:nvSpPr>
+          <p:cNvPr id="5" name="Rectangle 4">
+            <a:extLst>
+              <a:ext uri="{FF2B5EF4-FFF2-40B4-BE49-F238E27FC236}">
+                <a16:creationId xmlns:a16="http://schemas.microsoft.com/office/drawing/2014/main" id="{072487EE-6E8F-11FF-EF9D-EFD4ED2F8B4B}"/>
+              </a:ext>
+            </a:extLst>
+          </p:cNvPr>
+          <p:cNvSpPr/>
+          <p:nvPr/>
+        </p:nvSpPr>
+        <p:spPr>
+          <a:xfrm>
+            <a:off x="4953000" y="4800600"/>
+            <a:ext cx="2286000" cy="914400"/>
+          </a:xfrm>
+          <a:prstGeom prst="rect">
+            <a:avLst/>
+          </a:prstGeom>
+          <a:noFill/>
+          <a:ln w="28575" cap="flat" cmpd="sng" algn="ctr">
+            <a:solidFill>
+              <a:schemeClr val="accent1"/>
+            </a:solidFill>
+            <a:prstDash val="solid"/>
+            <a:round/>
+            <a:headEnd type="none" w="med" len="med"/>
+            <a:tailEnd type="none" w="med" len="med"/>
+          </a:ln>
+        </p:spPr>
+        <p:style>
+          <a:lnRef idx="0">
+            <a:scrgbClr r="0" g="0" b="0"/>
+          </a:lnRef>
+          <a:fillRef idx="0">
+            <a:scrgbClr r="0" g="0" b="0"/>
+          </a:fillRef>
+          <a:effectRef idx="0">
+            <a:scrgbClr r="0" g="0" b="0"/>
+          </a:effectRef>
+          <a:fontRef idx="minor">
+            <a:schemeClr val="accent1"/>
+          </a:fontRef>
+        </p:style>
+        <p:txBody>
+          <a:bodyPr rtlCol="0" anchor="ctr"/>
+          <a:lstStyle/>
+          <a:p>
+            <a:pPr algn="ctr"/>
+            <a:r>
+              <a:rPr lang="en-US" dirty="0">
+                <a:solidFill>
+                  <a:schemeClr val="tx1"/>
+                </a:solidFill>
+              </a:rPr>
+              <a:t>class D : public B, public C</a:t>
+            </a:r>
+          </a:p>
+        </p:txBody>
+      </p:sp>
+      <p:cxnSp>
+        <p:nvCxnSpPr>
+          <p:cNvPr id="6" name="Straight Arrow Connector 5">
+            <a:extLst>
+              <a:ext uri="{FF2B5EF4-FFF2-40B4-BE49-F238E27FC236}">
+                <a16:creationId xmlns:a16="http://schemas.microsoft.com/office/drawing/2014/main" id="{89C7F616-2CE3-9477-AB19-9901EC675DFB}"/>
+              </a:ext>
+            </a:extLst>
+          </p:cNvPr>
+          <p:cNvCxnSpPr>
+            <a:cxnSpLocks/>
+            <a:stCxn id="5" idx="0"/>
+            <a:endCxn id="3" idx="2"/>
+          </p:cNvCxnSpPr>
+          <p:nvPr/>
+        </p:nvCxnSpPr>
+        <p:spPr>
+          <a:xfrm flipH="1" flipV="1">
+            <a:off x="3810000" y="3886200"/>
+            <a:ext cx="2286000" cy="914400"/>
+          </a:xfrm>
+          <a:prstGeom prst="straightConnector1">
+            <a:avLst/>
+          </a:prstGeom>
+          <a:ln w="28575">
+            <a:solidFill>
+              <a:schemeClr val="accent4"/>
+            </a:solidFill>
+            <a:tailEnd type="triangle"/>
+          </a:ln>
+        </p:spPr>
+        <p:style>
+          <a:lnRef idx="2">
+            <a:schemeClr val="accent1"/>
+          </a:lnRef>
+          <a:fillRef idx="0">
+            <a:schemeClr val="accent1"/>
+          </a:fillRef>
+          <a:effectRef idx="1">
+            <a:schemeClr val="accent1"/>
+          </a:effectRef>
+          <a:fontRef idx="minor">
+            <a:schemeClr val="tx1"/>
+          </a:fontRef>
+        </p:style>
+      </p:cxnSp>
+      <p:cxnSp>
+        <p:nvCxnSpPr>
+          <p:cNvPr id="9" name="Straight Arrow Connector 8">
+            <a:extLst>
+              <a:ext uri="{FF2B5EF4-FFF2-40B4-BE49-F238E27FC236}">
+                <a16:creationId xmlns:a16="http://schemas.microsoft.com/office/drawing/2014/main" id="{1F767B2D-1318-CDC2-BD5F-8904071F140D}"/>
+              </a:ext>
+            </a:extLst>
+          </p:cNvPr>
+          <p:cNvCxnSpPr>
+            <a:cxnSpLocks/>
+            <a:stCxn id="5" idx="0"/>
+            <a:endCxn id="4" idx="2"/>
+          </p:cNvCxnSpPr>
+          <p:nvPr/>
+        </p:nvCxnSpPr>
+        <p:spPr>
+          <a:xfrm flipV="1">
+            <a:off x="6096000" y="3886200"/>
+            <a:ext cx="2286000" cy="914400"/>
+          </a:xfrm>
+          <a:prstGeom prst="straightConnector1">
+            <a:avLst/>
+          </a:prstGeom>
+          <a:ln w="28575">
+            <a:solidFill>
+              <a:schemeClr val="accent4"/>
+            </a:solidFill>
+            <a:tailEnd type="triangle"/>
+          </a:ln>
+        </p:spPr>
+        <p:style>
+          <a:lnRef idx="2">
+            <a:schemeClr val="accent1"/>
+          </a:lnRef>
+          <a:fillRef idx="0">
+            <a:schemeClr val="accent1"/>
+          </a:fillRef>
+          <a:effectRef idx="1">
+            <a:schemeClr val="accent1"/>
+          </a:effectRef>
+          <a:fontRef idx="minor">
+            <a:schemeClr val="tx1"/>
+          </a:fontRef>
+        </p:style>
+      </p:cxnSp>
+      <p:cxnSp>
+        <p:nvCxnSpPr>
+          <p:cNvPr id="12" name="Straight Arrow Connector 11">
+            <a:extLst>
+              <a:ext uri="{FF2B5EF4-FFF2-40B4-BE49-F238E27FC236}">
+                <a16:creationId xmlns:a16="http://schemas.microsoft.com/office/drawing/2014/main" id="{85522D77-DFA9-BA07-D1FC-5ABF331301A4}"/>
+              </a:ext>
+            </a:extLst>
+          </p:cNvPr>
+          <p:cNvCxnSpPr>
+            <a:cxnSpLocks/>
+            <a:stCxn id="3" idx="0"/>
+            <a:endCxn id="2" idx="2"/>
+          </p:cNvCxnSpPr>
+          <p:nvPr/>
+        </p:nvCxnSpPr>
+        <p:spPr>
+          <a:xfrm flipV="1">
+            <a:off x="3810000" y="2057400"/>
+            <a:ext cx="2286000" cy="914400"/>
+          </a:xfrm>
+          <a:prstGeom prst="straightConnector1">
+            <a:avLst/>
+          </a:prstGeom>
+          <a:ln w="28575">
+            <a:solidFill>
+              <a:schemeClr val="accent4"/>
+            </a:solidFill>
+            <a:tailEnd type="triangle"/>
+          </a:ln>
+        </p:spPr>
+        <p:style>
+          <a:lnRef idx="2">
+            <a:schemeClr val="accent1"/>
+          </a:lnRef>
+          <a:fillRef idx="0">
+            <a:schemeClr val="accent1"/>
+          </a:fillRef>
+          <a:effectRef idx="1">
+            <a:schemeClr val="accent1"/>
+          </a:effectRef>
+          <a:fontRef idx="minor">
+            <a:schemeClr val="tx1"/>
+          </a:fontRef>
+        </p:style>
+      </p:cxnSp>
+      <p:cxnSp>
+        <p:nvCxnSpPr>
+          <p:cNvPr id="15" name="Straight Arrow Connector 14">
+            <a:extLst>
+              <a:ext uri="{FF2B5EF4-FFF2-40B4-BE49-F238E27FC236}">
+                <a16:creationId xmlns:a16="http://schemas.microsoft.com/office/drawing/2014/main" id="{75F3821C-0094-F8AB-A5B2-F76056E4F06A}"/>
+              </a:ext>
+            </a:extLst>
+          </p:cNvPr>
+          <p:cNvCxnSpPr>
+            <a:cxnSpLocks/>
+            <a:stCxn id="4" idx="0"/>
+            <a:endCxn id="2" idx="2"/>
+          </p:cNvCxnSpPr>
+          <p:nvPr/>
+        </p:nvCxnSpPr>
+        <p:spPr>
+          <a:xfrm flipH="1" flipV="1">
+            <a:off x="6096000" y="2057400"/>
+            <a:ext cx="2286000" cy="914400"/>
+          </a:xfrm>
+          <a:prstGeom prst="straightConnector1">
+            <a:avLst/>
+          </a:prstGeom>
+          <a:ln w="28575">
+            <a:solidFill>
+              <a:schemeClr val="accent4"/>
+            </a:solidFill>
+            <a:tailEnd type="triangle"/>
+          </a:ln>
+        </p:spPr>
+        <p:style>
+          <a:lnRef idx="2">
+            <a:schemeClr val="accent1"/>
+          </a:lnRef>
+          <a:fillRef idx="0">
+            <a:schemeClr val="accent1"/>
+          </a:fillRef>
+          <a:effectRef idx="1">
+            <a:schemeClr val="accent1"/>
+          </a:effectRef>
+          <a:fontRef idx="minor">
+            <a:schemeClr val="tx1"/>
+          </a:fontRef>
+        </p:style>
+      </p:cxnSp>
+    </p:spTree>
+    <p:extLst>
+      <p:ext uri="{BB962C8B-B14F-4D97-AF65-F5344CB8AC3E}">
+        <p14:creationId xmlns:p14="http://schemas.microsoft.com/office/powerpoint/2010/main" val="724238145"/>
+      </p:ext>
+    </p:extLst>
+  </p:cSld>
+  <p:clrMapOvr>
+    <a:masterClrMapping/>
+  </p:clrMapOvr>
+</p:sld>
+</file>
+
 <file path=ppt/slides/slide3.xml><?xml version="1.0" encoding="utf-8"?>
 <p:sld xmlns:a="http://schemas.openxmlformats.org/drawingml/2006/main" xmlns:r="http://schemas.openxmlformats.org/officeDocument/2006/relationships" xmlns:p="http://schemas.openxmlformats.org/presentationml/2006/main">
   <p:cSld>

</xml_diff>